<commit_message>
feat(map): fixed errors + added odd cases
</commit_message>
<xml_diff>
--- a/supports/source/03-MapReduce.pptx
+++ b/supports/source/03-MapReduce.pptx
@@ -119,7 +119,7 @@
 <file path=ppt/revisionInfo.xml><?xml version="1.0" encoding="utf-8"?>
 <p1510:revInfo xmlns:a="http://schemas.openxmlformats.org/drawingml/2006/main" xmlns:r="http://schemas.openxmlformats.org/officeDocument/2006/relationships" xmlns:p1510="http://schemas.microsoft.com/office/powerpoint/2015/10/main">
   <p1510:revLst>
-    <p1510:client id="{AD8E263C-854F-48CC-9DB3-54AC5F7F0AB4}" v="21" dt="2024-09-10T13:40:03.630"/>
+    <p1510:client id="{AD8E263C-854F-48CC-9DB3-54AC5F7F0AB4}" v="27" dt="2024-09-13T09:26:48.632"/>
   </p1510:revLst>
 </p1510:revInfo>
 </file>
@@ -366,7 +366,7 @@
   <pc:docChgLst>
     <pc:chgData name="Jonathan Melly" userId="a7718738-f2aa-4d1b-bcf4-5a9c900fe107" providerId="ADAL" clId="{AD8E263C-854F-48CC-9DB3-54AC5F7F0AB4}"/>
     <pc:docChg chg="undo custSel addSld delSld modSld">
-      <pc:chgData name="Jonathan Melly" userId="a7718738-f2aa-4d1b-bcf4-5a9c900fe107" providerId="ADAL" clId="{AD8E263C-854F-48CC-9DB3-54AC5F7F0AB4}" dt="2024-09-10T13:40:03.630" v="549"/>
+      <pc:chgData name="Jonathan Melly" userId="a7718738-f2aa-4d1b-bcf4-5a9c900fe107" providerId="ADAL" clId="{AD8E263C-854F-48CC-9DB3-54AC5F7F0AB4}" dt="2024-09-13T09:27:57.361" v="574" actId="404"/>
       <pc:docMkLst>
         <pc:docMk/>
       </pc:docMkLst>
@@ -414,8 +414,8 @@
           <pc:sldMk cId="170282062" sldId="259"/>
         </pc:sldMkLst>
       </pc:sldChg>
-      <pc:sldChg chg="addSp delSp modSp new mod modAnim">
-        <pc:chgData name="Jonathan Melly" userId="a7718738-f2aa-4d1b-bcf4-5a9c900fe107" providerId="ADAL" clId="{AD8E263C-854F-48CC-9DB3-54AC5F7F0AB4}" dt="2024-09-10T13:34:38.530" v="308" actId="1076"/>
+      <pc:sldChg chg="addSp delSp modSp new mod delAnim modAnim">
+        <pc:chgData name="Jonathan Melly" userId="a7718738-f2aa-4d1b-bcf4-5a9c900fe107" providerId="ADAL" clId="{AD8E263C-854F-48CC-9DB3-54AC5F7F0AB4}" dt="2024-09-13T09:27:57.361" v="574" actId="404"/>
         <pc:sldMkLst>
           <pc:docMk/>
           <pc:sldMk cId="243643821" sldId="260"/>
@@ -436,12 +436,20 @@
             <ac:spMk id="3" creationId="{394D482F-85DC-9CA1-32A6-0D22853DE909}"/>
           </ac:spMkLst>
         </pc:spChg>
-        <pc:spChg chg="add mod">
-          <ac:chgData name="Jonathan Melly" userId="a7718738-f2aa-4d1b-bcf4-5a9c900fe107" providerId="ADAL" clId="{AD8E263C-854F-48CC-9DB3-54AC5F7F0AB4}" dt="2024-09-10T13:34:38.530" v="308" actId="1076"/>
+        <pc:spChg chg="add del mod">
+          <ac:chgData name="Jonathan Melly" userId="a7718738-f2aa-4d1b-bcf4-5a9c900fe107" providerId="ADAL" clId="{AD8E263C-854F-48CC-9DB3-54AC5F7F0AB4}" dt="2024-09-13T09:27:19.636" v="561" actId="478"/>
           <ac:spMkLst>
             <pc:docMk/>
             <pc:sldMk cId="243643821" sldId="260"/>
             <ac:spMk id="5" creationId="{6329AE06-BAB7-D5DD-18D1-354EF6921125}"/>
+          </ac:spMkLst>
+        </pc:spChg>
+        <pc:spChg chg="add del">
+          <ac:chgData name="Jonathan Melly" userId="a7718738-f2aa-4d1b-bcf4-5a9c900fe107" providerId="ADAL" clId="{AD8E263C-854F-48CC-9DB3-54AC5F7F0AB4}" dt="2024-09-13T09:26:55.806" v="557" actId="22"/>
+          <ac:spMkLst>
+            <pc:docMk/>
+            <pc:sldMk cId="243643821" sldId="260"/>
+            <ac:spMk id="6" creationId="{F129926D-A64E-D30D-F6A5-02035E3E6CC0}"/>
           </ac:spMkLst>
         </pc:spChg>
         <pc:spChg chg="add del mod">
@@ -452,9 +460,17 @@
             <ac:spMk id="7" creationId="{2EB168C0-04DF-9F90-75CB-87D5639CCC83}"/>
           </ac:spMkLst>
         </pc:spChg>
+        <pc:spChg chg="add mod">
+          <ac:chgData name="Jonathan Melly" userId="a7718738-f2aa-4d1b-bcf4-5a9c900fe107" providerId="ADAL" clId="{AD8E263C-854F-48CC-9DB3-54AC5F7F0AB4}" dt="2024-09-13T09:27:57.361" v="574" actId="404"/>
+          <ac:spMkLst>
+            <pc:docMk/>
+            <pc:sldMk cId="243643821" sldId="260"/>
+            <ac:spMk id="8" creationId="{214662C4-CD19-A3A5-C53C-3C9712C17A30}"/>
+          </ac:spMkLst>
+        </pc:spChg>
       </pc:sldChg>
       <pc:sldChg chg="addSp modSp new mod modAnim">
-        <pc:chgData name="Jonathan Melly" userId="a7718738-f2aa-4d1b-bcf4-5a9c900fe107" providerId="ADAL" clId="{AD8E263C-854F-48CC-9DB3-54AC5F7F0AB4}" dt="2024-09-10T13:34:30.231" v="307"/>
+        <pc:chgData name="Jonathan Melly" userId="a7718738-f2aa-4d1b-bcf4-5a9c900fe107" providerId="ADAL" clId="{AD8E263C-854F-48CC-9DB3-54AC5F7F0AB4}" dt="2024-09-13T09:21:01.890" v="553" actId="20577"/>
         <pc:sldMkLst>
           <pc:docMk/>
           <pc:sldMk cId="2128962690" sldId="261"/>
@@ -476,7 +492,7 @@
           </ac:spMkLst>
         </pc:spChg>
         <pc:spChg chg="add mod">
-          <ac:chgData name="Jonathan Melly" userId="a7718738-f2aa-4d1b-bcf4-5a9c900fe107" providerId="ADAL" clId="{AD8E263C-854F-48CC-9DB3-54AC5F7F0AB4}" dt="2024-09-10T13:34:23.214" v="306" actId="403"/>
+          <ac:chgData name="Jonathan Melly" userId="a7718738-f2aa-4d1b-bcf4-5a9c900fe107" providerId="ADAL" clId="{AD8E263C-854F-48CC-9DB3-54AC5F7F0AB4}" dt="2024-09-13T09:21:01.890" v="553" actId="20577"/>
           <ac:spMkLst>
             <pc:docMk/>
             <pc:sldMk cId="2128962690" sldId="261"/>
@@ -684,7 +700,7 @@
           <a:p>
             <a:fld id="{5AEE9901-D54F-483E-910A-A3C293F4A3A0}" type="datetimeFigureOut">
               <a:rPr lang="fr-CH" smtClean="0"/>
-              <a:t>10.09.2024</a:t>
+              <a:t>13.09.2024</a:t>
             </a:fld>
             <a:endParaRPr lang="fr-CH"/>
           </a:p>
@@ -971,7 +987,7 @@
           <a:p>
             <a:fld id="{5AEE9901-D54F-483E-910A-A3C293F4A3A0}" type="datetimeFigureOut">
               <a:rPr lang="fr-CH" smtClean="0"/>
-              <a:t>10.09.2024</a:t>
+              <a:t>13.09.2024</a:t>
             </a:fld>
             <a:endParaRPr lang="fr-CH"/>
           </a:p>
@@ -1163,7 +1179,7 @@
           <a:p>
             <a:fld id="{5AEE9901-D54F-483E-910A-A3C293F4A3A0}" type="datetimeFigureOut">
               <a:rPr lang="fr-CH" smtClean="0"/>
-              <a:t>10.09.2024</a:t>
+              <a:t>13.09.2024</a:t>
             </a:fld>
             <a:endParaRPr lang="fr-CH"/>
           </a:p>
@@ -1424,7 +1440,7 @@
           <a:p>
             <a:fld id="{5AEE9901-D54F-483E-910A-A3C293F4A3A0}" type="datetimeFigureOut">
               <a:rPr lang="fr-CH" smtClean="0"/>
-              <a:t>10.09.2024</a:t>
+              <a:t>13.09.2024</a:t>
             </a:fld>
             <a:endParaRPr lang="fr-CH"/>
           </a:p>
@@ -1848,7 +1864,7 @@
           <a:p>
             <a:fld id="{5AEE9901-D54F-483E-910A-A3C293F4A3A0}" type="datetimeFigureOut">
               <a:rPr lang="fr-CH" smtClean="0"/>
-              <a:t>10.09.2024</a:t>
+              <a:t>13.09.2024</a:t>
             </a:fld>
             <a:endParaRPr lang="fr-CH"/>
           </a:p>
@@ -2394,7 +2410,7 @@
           <a:p>
             <a:fld id="{5AEE9901-D54F-483E-910A-A3C293F4A3A0}" type="datetimeFigureOut">
               <a:rPr lang="fr-CH" smtClean="0"/>
-              <a:t>10.09.2024</a:t>
+              <a:t>13.09.2024</a:t>
             </a:fld>
             <a:endParaRPr lang="fr-CH"/>
           </a:p>
@@ -3234,7 +3250,7 @@
           <a:p>
             <a:fld id="{5AEE9901-D54F-483E-910A-A3C293F4A3A0}" type="datetimeFigureOut">
               <a:rPr lang="fr-CH" smtClean="0"/>
-              <a:t>10.09.2024</a:t>
+              <a:t>13.09.2024</a:t>
             </a:fld>
             <a:endParaRPr lang="fr-CH"/>
           </a:p>
@@ -3404,7 +3420,7 @@
           <a:p>
             <a:fld id="{5AEE9901-D54F-483E-910A-A3C293F4A3A0}" type="datetimeFigureOut">
               <a:rPr lang="fr-CH" smtClean="0"/>
-              <a:t>10.09.2024</a:t>
+              <a:t>13.09.2024</a:t>
             </a:fld>
             <a:endParaRPr lang="fr-CH"/>
           </a:p>
@@ -3588,7 +3604,7 @@
           <a:p>
             <a:fld id="{5AEE9901-D54F-483E-910A-A3C293F4A3A0}" type="datetimeFigureOut">
               <a:rPr lang="fr-CH" smtClean="0"/>
-              <a:t>10.09.2024</a:t>
+              <a:t>13.09.2024</a:t>
             </a:fld>
             <a:endParaRPr lang="fr-CH"/>
           </a:p>
@@ -3758,7 +3774,7 @@
           <a:p>
             <a:fld id="{5AEE9901-D54F-483E-910A-A3C293F4A3A0}" type="datetimeFigureOut">
               <a:rPr lang="fr-CH" smtClean="0"/>
-              <a:t>10.09.2024</a:t>
+              <a:t>13.09.2024</a:t>
             </a:fld>
             <a:endParaRPr lang="fr-CH"/>
           </a:p>
@@ -4006,7 +4022,7 @@
           <a:p>
             <a:fld id="{5AEE9901-D54F-483E-910A-A3C293F4A3A0}" type="datetimeFigureOut">
               <a:rPr lang="fr-CH" smtClean="0"/>
-              <a:t>10.09.2024</a:t>
+              <a:t>13.09.2024</a:t>
             </a:fld>
             <a:endParaRPr lang="fr-CH"/>
           </a:p>
@@ -4243,7 +4259,7 @@
           <a:p>
             <a:fld id="{5AEE9901-D54F-483E-910A-A3C293F4A3A0}" type="datetimeFigureOut">
               <a:rPr lang="fr-CH" smtClean="0"/>
-              <a:t>10.09.2024</a:t>
+              <a:t>13.09.2024</a:t>
             </a:fld>
             <a:endParaRPr lang="fr-CH"/>
           </a:p>
@@ -4616,7 +4632,7 @@
           <a:p>
             <a:fld id="{5AEE9901-D54F-483E-910A-A3C293F4A3A0}" type="datetimeFigureOut">
               <a:rPr lang="fr-CH" smtClean="0"/>
-              <a:t>10.09.2024</a:t>
+              <a:t>13.09.2024</a:t>
             </a:fld>
             <a:endParaRPr lang="fr-CH"/>
           </a:p>
@@ -4734,7 +4750,7 @@
           <a:p>
             <a:fld id="{5AEE9901-D54F-483E-910A-A3C293F4A3A0}" type="datetimeFigureOut">
               <a:rPr lang="fr-CH" smtClean="0"/>
-              <a:t>10.09.2024</a:t>
+              <a:t>13.09.2024</a:t>
             </a:fld>
             <a:endParaRPr lang="fr-CH"/>
           </a:p>
@@ -4829,7 +4845,7 @@
           <a:p>
             <a:fld id="{5AEE9901-D54F-483E-910A-A3C293F4A3A0}" type="datetimeFigureOut">
               <a:rPr lang="fr-CH" smtClean="0"/>
-              <a:t>10.09.2024</a:t>
+              <a:t>13.09.2024</a:t>
             </a:fld>
             <a:endParaRPr lang="fr-CH"/>
           </a:p>
@@ -5080,7 +5096,7 @@
           <a:p>
             <a:fld id="{5AEE9901-D54F-483E-910A-A3C293F4A3A0}" type="datetimeFigureOut">
               <a:rPr lang="fr-CH" smtClean="0"/>
-              <a:t>10.09.2024</a:t>
+              <a:t>13.09.2024</a:t>
             </a:fld>
             <a:endParaRPr lang="fr-CH"/>
           </a:p>
@@ -5367,7 +5383,7 @@
           <a:p>
             <a:fld id="{5AEE9901-D54F-483E-910A-A3C293F4A3A0}" type="datetimeFigureOut">
               <a:rPr lang="fr-CH" smtClean="0"/>
-              <a:t>10.09.2024</a:t>
+              <a:t>13.09.2024</a:t>
             </a:fld>
             <a:endParaRPr lang="fr-CH"/>
           </a:p>
@@ -5580,7 +5596,7 @@
           <a:p>
             <a:fld id="{5AEE9901-D54F-483E-910A-A3C293F4A3A0}" type="datetimeFigureOut">
               <a:rPr lang="fr-CH" smtClean="0"/>
-              <a:t>10.09.2024</a:t>
+              <a:t>13.09.2024</a:t>
             </a:fld>
             <a:endParaRPr lang="fr-CH"/>
           </a:p>
@@ -6233,10 +6249,10 @@
       </p:sp>
       <p:sp>
         <p:nvSpPr>
-          <p:cNvPr id="5" name="ZoneTexte 4">
+          <p:cNvPr id="8" name="ZoneTexte 7">
             <a:extLst>
               <a:ext uri="{FF2B5EF4-FFF2-40B4-BE49-F238E27FC236}">
-                <a16:creationId xmlns:a16="http://schemas.microsoft.com/office/drawing/2014/main" id="{6329AE06-BAB7-D5DD-18D1-354EF6921125}"/>
+                <a16:creationId xmlns:a16="http://schemas.microsoft.com/office/drawing/2014/main" id="{214662C4-CD19-A3A5-C53C-3C9712C17A30}"/>
               </a:ext>
             </a:extLst>
           </p:cNvPr>
@@ -6245,8 +6261,8 @@
         </p:nvSpPr>
         <p:spPr>
           <a:xfrm>
-            <a:off x="208307" y="3665287"/>
-            <a:ext cx="11764735" cy="2862322"/>
+            <a:off x="253094" y="3943632"/>
+            <a:ext cx="11666764" cy="2431435"/>
           </a:xfrm>
           <a:prstGeom prst="rect">
             <a:avLst/>
@@ -6273,7 +6289,7 @@
           <a:lstStyle/>
           <a:p>
             <a:r>
-              <a:rPr lang="fr-CH" sz="1600" dirty="0">
+              <a:rPr lang="fr-CH" sz="1400" dirty="0">
                 <a:solidFill>
                   <a:srgbClr val="0000FF"/>
                 </a:solidFill>
@@ -6282,7 +6298,7 @@
               <a:t>var</a:t>
             </a:r>
             <a:r>
-              <a:rPr lang="fr-CH" sz="1600" dirty="0">
+              <a:rPr lang="fr-CH" sz="1400" dirty="0">
                 <a:solidFill>
                   <a:srgbClr val="000000"/>
                 </a:solidFill>
@@ -6291,7 +6307,7 @@
               <a:t> </a:t>
             </a:r>
             <a:r>
-              <a:rPr lang="fr-CH" sz="1600" dirty="0" err="1">
+              <a:rPr lang="fr-CH" sz="1400" dirty="0" err="1">
                 <a:solidFill>
                   <a:srgbClr val="000000"/>
                 </a:solidFill>
@@ -6300,7 +6316,7 @@
               <a:t>numbers</a:t>
             </a:r>
             <a:r>
-              <a:rPr lang="fr-CH" sz="1600" dirty="0">
+              <a:rPr lang="fr-CH" sz="1400" dirty="0">
                 <a:solidFill>
                   <a:srgbClr val="000000"/>
                 </a:solidFill>
@@ -6309,7 +6325,7 @@
               <a:t> = </a:t>
             </a:r>
             <a:r>
-              <a:rPr lang="fr-CH" sz="1600" dirty="0" err="1">
+              <a:rPr lang="fr-CH" sz="1400" dirty="0" err="1">
                 <a:solidFill>
                   <a:srgbClr val="000000"/>
                 </a:solidFill>
@@ -6318,7 +6334,7 @@
               <a:t>Enumerable.Range</a:t>
             </a:r>
             <a:r>
-              <a:rPr lang="fr-CH" sz="1600" dirty="0">
+              <a:rPr lang="fr-CH" sz="1400" dirty="0">
                 <a:solidFill>
                   <a:srgbClr val="000000"/>
                 </a:solidFill>
@@ -6327,7 +6343,7 @@
               <a:t>(0, 5); </a:t>
             </a:r>
             <a:r>
-              <a:rPr lang="fr-CH" sz="1600" dirty="0">
+              <a:rPr lang="fr-CH" sz="1400" dirty="0">
                 <a:solidFill>
                   <a:srgbClr val="008000"/>
                 </a:solidFill>
@@ -6335,9 +6351,7 @@
               </a:rPr>
               <a:t>//0,1,2,3,4</a:t>
             </a:r>
-          </a:p>
-          <a:p>
-            <a:endParaRPr lang="fr-CH" sz="1600" dirty="0">
+            <a:endParaRPr lang="fr-CH" sz="1400" dirty="0">
               <a:solidFill>
                 <a:srgbClr val="000000"/>
               </a:solidFill>
@@ -6345,36 +6359,7 @@
             </a:endParaRPr>
           </a:p>
           <a:p>
-            <a:r>
-              <a:rPr lang="fr-CH" sz="1600" dirty="0" err="1">
-                <a:solidFill>
-                  <a:srgbClr val="000000"/>
-                </a:solidFill>
-                <a:latin typeface="Cascadia Mono" panose="020B0609020000020004" pitchFamily="49" charset="0"/>
-              </a:rPr>
-              <a:t>numbers.Select</a:t>
-            </a:r>
-            <a:r>
-              <a:rPr lang="fr-CH" sz="1600" dirty="0">
-                <a:solidFill>
-                  <a:srgbClr val="000000"/>
-                </a:solidFill>
-                <a:latin typeface="Cascadia Mono" panose="020B0609020000020004" pitchFamily="49" charset="0"/>
-              </a:rPr>
-              <a:t>(_ =&gt; 1);</a:t>
-            </a:r>
-            <a:r>
-              <a:rPr lang="fr-CH" sz="1600" dirty="0">
-                <a:solidFill>
-                  <a:srgbClr val="008000"/>
-                </a:solidFill>
-                <a:latin typeface="Cascadia Mono" panose="020B0609020000020004" pitchFamily="49" charset="0"/>
-              </a:rPr>
-              <a:t>//1,1,1,1,1</a:t>
-            </a:r>
-          </a:p>
-          <a:p>
-            <a:endParaRPr lang="fr-CH" sz="1600" dirty="0">
+            <a:endParaRPr lang="fr-CH" sz="1400" dirty="0">
               <a:solidFill>
                 <a:srgbClr val="000000"/>
               </a:solidFill>
@@ -6383,7 +6368,7 @@
           </a:p>
           <a:p>
             <a:r>
-              <a:rPr lang="en-US" sz="1600" dirty="0" err="1">
+              <a:rPr lang="en-US" sz="1400" dirty="0" err="1">
                 <a:solidFill>
                   <a:srgbClr val="000000"/>
                 </a:solidFill>
@@ -6392,59 +6377,24 @@
               <a:t>numbers.Select</a:t>
             </a:r>
             <a:r>
-              <a:rPr lang="en-US" sz="1600" dirty="0">
+              <a:rPr lang="en-US" sz="1400" dirty="0">
                 <a:solidFill>
                   <a:srgbClr val="000000"/>
                 </a:solidFill>
                 <a:latin typeface="Cascadia Mono" panose="020B0609020000020004" pitchFamily="49" charset="0"/>
               </a:rPr>
-              <a:t>(_ =&gt; </a:t>
-            </a:r>
-            <a:r>
-              <a:rPr lang="en-US" sz="1600" dirty="0">
-                <a:solidFill>
-                  <a:srgbClr val="0000FF"/>
+              <a:t>(_ =&gt; 1).Print();</a:t>
+            </a:r>
+            <a:r>
+              <a:rPr lang="en-US" sz="1400" dirty="0">
+                <a:solidFill>
+                  <a:srgbClr val="008000"/>
                 </a:solidFill>
                 <a:latin typeface="Cascadia Mono" panose="020B0609020000020004" pitchFamily="49" charset="0"/>
               </a:rPr>
-              <a:t>new</a:t>
-            </a:r>
-            <a:r>
-              <a:rPr lang="en-US" sz="1600" dirty="0">
-                <a:solidFill>
-                  <a:srgbClr val="000000"/>
-                </a:solidFill>
-                <a:latin typeface="Cascadia Mono" panose="020B0609020000020004" pitchFamily="49" charset="0"/>
-              </a:rPr>
-              <a:t> Object());</a:t>
-            </a:r>
-            <a:r>
-              <a:rPr lang="en-US" sz="1600" dirty="0">
-                <a:solidFill>
-                  <a:srgbClr val="008000"/>
-                </a:solidFill>
-                <a:latin typeface="Cascadia Mono" panose="020B0609020000020004" pitchFamily="49" charset="0"/>
-              </a:rPr>
-              <a:t>//</a:t>
-            </a:r>
-            <a:r>
-              <a:rPr lang="en-US" sz="1600" dirty="0" err="1">
-                <a:solidFill>
-                  <a:srgbClr val="008000"/>
-                </a:solidFill>
-                <a:latin typeface="Cascadia Mono" panose="020B0609020000020004" pitchFamily="49" charset="0"/>
-              </a:rPr>
-              <a:t>object,object,object,object,object</a:t>
-            </a:r>
-            <a:endParaRPr lang="en-US" sz="1600" dirty="0">
-              <a:solidFill>
-                <a:srgbClr val="008000"/>
-              </a:solidFill>
-              <a:latin typeface="Cascadia Mono" panose="020B0609020000020004" pitchFamily="49" charset="0"/>
-            </a:endParaRPr>
-          </a:p>
-          <a:p>
-            <a:endParaRPr lang="en-US" sz="1600" dirty="0">
+              <a:t>//1,1,1,1,1</a:t>
+            </a:r>
+            <a:endParaRPr lang="en-US" sz="1400" dirty="0">
               <a:solidFill>
                 <a:srgbClr val="000000"/>
               </a:solidFill>
@@ -6452,105 +6402,7 @@
             </a:endParaRPr>
           </a:p>
           <a:p>
-            <a:r>
-              <a:rPr lang="en-US" sz="1600" dirty="0" err="1">
-                <a:solidFill>
-                  <a:srgbClr val="000000"/>
-                </a:solidFill>
-                <a:latin typeface="Cascadia Mono" panose="020B0609020000020004" pitchFamily="49" charset="0"/>
-              </a:rPr>
-              <a:t>numbers.Select</a:t>
-            </a:r>
-            <a:r>
-              <a:rPr lang="en-US" sz="1600" dirty="0">
-                <a:solidFill>
-                  <a:srgbClr val="000000"/>
-                </a:solidFill>
-                <a:latin typeface="Cascadia Mono" panose="020B0609020000020004" pitchFamily="49" charset="0"/>
-              </a:rPr>
-              <a:t>(number =&gt; </a:t>
-            </a:r>
-            <a:r>
-              <a:rPr lang="en-US" sz="1600" dirty="0">
-                <a:solidFill>
-                  <a:srgbClr val="0000FF"/>
-                </a:solidFill>
-                <a:latin typeface="Cascadia Mono" panose="020B0609020000020004" pitchFamily="49" charset="0"/>
-              </a:rPr>
-              <a:t>new</a:t>
-            </a:r>
-            <a:r>
-              <a:rPr lang="en-US" sz="1600" dirty="0">
-                <a:solidFill>
-                  <a:srgbClr val="000000"/>
-                </a:solidFill>
-                <a:latin typeface="Cascadia Mono" panose="020B0609020000020004" pitchFamily="49" charset="0"/>
-              </a:rPr>
-              <a:t> </a:t>
-            </a:r>
-            <a:r>
-              <a:rPr lang="en-US" sz="1600" dirty="0">
-                <a:solidFill>
-                  <a:srgbClr val="0000FF"/>
-                </a:solidFill>
-                <a:latin typeface="Cascadia Mono" panose="020B0609020000020004" pitchFamily="49" charset="0"/>
-              </a:rPr>
-              <a:t>string</a:t>
-            </a:r>
-            <a:r>
-              <a:rPr lang="en-US" sz="1600" dirty="0">
-                <a:solidFill>
-                  <a:srgbClr val="000000"/>
-                </a:solidFill>
-                <a:latin typeface="Cascadia Mono" panose="020B0609020000020004" pitchFamily="49" charset="0"/>
-              </a:rPr>
-              <a:t>(</a:t>
-            </a:r>
-            <a:r>
-              <a:rPr lang="en-US" sz="1600" dirty="0">
-                <a:solidFill>
-                  <a:srgbClr val="A31515"/>
-                </a:solidFill>
-                <a:latin typeface="Cascadia Mono" panose="020B0609020000020004" pitchFamily="49" charset="0"/>
-              </a:rPr>
-              <a:t>'a'</a:t>
-            </a:r>
-            <a:r>
-              <a:rPr lang="en-US" sz="1600" dirty="0">
-                <a:solidFill>
-                  <a:srgbClr val="000000"/>
-                </a:solidFill>
-                <a:latin typeface="Cascadia Mono" panose="020B0609020000020004" pitchFamily="49" charset="0"/>
-              </a:rPr>
-              <a:t>, number));</a:t>
-            </a:r>
-            <a:r>
-              <a:rPr lang="en-US" sz="1600" dirty="0">
-                <a:solidFill>
-                  <a:srgbClr val="008000"/>
-                </a:solidFill>
-                <a:latin typeface="Cascadia Mono" panose="020B0609020000020004" pitchFamily="49" charset="0"/>
-              </a:rPr>
-              <a:t>//</a:t>
-            </a:r>
-            <a:r>
-              <a:rPr lang="en-US" sz="1600" dirty="0" err="1">
-                <a:solidFill>
-                  <a:srgbClr val="008000"/>
-                </a:solidFill>
-                <a:latin typeface="Cascadia Mono" panose="020B0609020000020004" pitchFamily="49" charset="0"/>
-              </a:rPr>
-              <a:t>a,aa,aaa,aaaa,aaaaa</a:t>
-            </a:r>
-            <a:endParaRPr lang="en-US" sz="1600" dirty="0">
-              <a:solidFill>
-                <a:srgbClr val="008000"/>
-              </a:solidFill>
-              <a:latin typeface="Cascadia Mono" panose="020B0609020000020004" pitchFamily="49" charset="0"/>
-            </a:endParaRPr>
-          </a:p>
-          <a:p>
-            <a:endParaRPr lang="en-US" sz="1600" dirty="0">
+            <a:endParaRPr lang="fr-CH" sz="1400" dirty="0">
               <a:solidFill>
                 <a:srgbClr val="000000"/>
               </a:solidFill>
@@ -6559,62 +6411,60 @@
           </a:p>
           <a:p>
             <a:r>
-              <a:rPr lang="en-US" sz="1600" dirty="0" err="1">
-                <a:solidFill>
-                  <a:srgbClr val="0000FF"/>
+              <a:rPr lang="en-US" sz="1400" dirty="0" err="1">
+                <a:solidFill>
+                  <a:srgbClr val="000000"/>
                 </a:solidFill>
                 <a:latin typeface="Cascadia Mono" panose="020B0609020000020004" pitchFamily="49" charset="0"/>
               </a:rPr>
-              <a:t>string</a:t>
-            </a:r>
-            <a:r>
-              <a:rPr lang="en-US" sz="1600" dirty="0" err="1">
+              <a:t>numbers.Select</a:t>
+            </a:r>
+            <a:r>
+              <a:rPr lang="en-US" sz="1400" dirty="0">
                 <a:solidFill>
                   <a:srgbClr val="000000"/>
                 </a:solidFill>
                 <a:latin typeface="Cascadia Mono" panose="020B0609020000020004" pitchFamily="49" charset="0"/>
               </a:rPr>
-              <a:t>.Join</a:t>
-            </a:r>
-            <a:r>
-              <a:rPr lang="en-US" sz="1600" dirty="0">
-                <a:solidFill>
-                  <a:srgbClr val="000000"/>
+              <a:t>(_ =&gt; </a:t>
+            </a:r>
+            <a:r>
+              <a:rPr lang="en-US" sz="1400" dirty="0">
+                <a:solidFill>
+                  <a:srgbClr val="0000FF"/>
                 </a:solidFill>
                 <a:latin typeface="Cascadia Mono" panose="020B0609020000020004" pitchFamily="49" charset="0"/>
               </a:rPr>
-              <a:t>(</a:t>
-            </a:r>
-            <a:r>
-              <a:rPr lang="en-US" sz="1600" dirty="0">
-                <a:solidFill>
-                  <a:srgbClr val="A31515"/>
+              <a:t>new</a:t>
+            </a:r>
+            <a:r>
+              <a:rPr lang="en-US" sz="1400" dirty="0">
+                <a:solidFill>
+                  <a:srgbClr val="000000"/>
                 </a:solidFill>
                 <a:latin typeface="Cascadia Mono" panose="020B0609020000020004" pitchFamily="49" charset="0"/>
               </a:rPr>
-              <a:t>','</a:t>
-            </a:r>
-            <a:r>
-              <a:rPr lang="en-US" sz="1600" dirty="0">
-                <a:solidFill>
-                  <a:srgbClr val="000000"/>
+              <a:t> Object()).Print();</a:t>
+            </a:r>
+            <a:r>
+              <a:rPr lang="en-US" sz="1400" dirty="0">
+                <a:solidFill>
+                  <a:srgbClr val="008000"/>
                 </a:solidFill>
                 <a:latin typeface="Cascadia Mono" panose="020B0609020000020004" pitchFamily="49" charset="0"/>
               </a:rPr>
-              <a:t>, numbers).Select(character =&gt; Convert.ToInt32(character)+1);</a:t>
-            </a:r>
-            <a:r>
-              <a:rPr lang="en-US" sz="1600" dirty="0">
+              <a:t>//</a:t>
+            </a:r>
+            <a:r>
+              <a:rPr lang="en-US" sz="1400" dirty="0" err="1">
                 <a:solidFill>
                   <a:srgbClr val="008000"/>
                 </a:solidFill>
                 <a:latin typeface="Cascadia Mono" panose="020B0609020000020004" pitchFamily="49" charset="0"/>
               </a:rPr>
-              <a:t>//1,2,3,4,5</a:t>
-            </a:r>
-          </a:p>
-          <a:p>
-            <a:endParaRPr lang="en-US" sz="1600" dirty="0">
+              <a:t>object,object,object,object,object</a:t>
+            </a:r>
+            <a:endParaRPr lang="en-US" sz="1400" dirty="0">
               <a:solidFill>
                 <a:srgbClr val="000000"/>
               </a:solidFill>
@@ -6622,8 +6472,192 @@
             </a:endParaRPr>
           </a:p>
           <a:p>
-            <a:r>
-              <a:rPr lang="en-US" sz="1600" dirty="0">
+            <a:endParaRPr lang="fr-CH" sz="1400" dirty="0">
+              <a:solidFill>
+                <a:srgbClr val="000000"/>
+              </a:solidFill>
+              <a:latin typeface="Cascadia Mono" panose="020B0609020000020004" pitchFamily="49" charset="0"/>
+            </a:endParaRPr>
+          </a:p>
+          <a:p>
+            <a:r>
+              <a:rPr lang="en-US" sz="1400" dirty="0" err="1">
+                <a:solidFill>
+                  <a:srgbClr val="000000"/>
+                </a:solidFill>
+                <a:latin typeface="Cascadia Mono" panose="020B0609020000020004" pitchFamily="49" charset="0"/>
+              </a:rPr>
+              <a:t>numbers.Select</a:t>
+            </a:r>
+            <a:r>
+              <a:rPr lang="en-US" sz="1400" dirty="0">
+                <a:solidFill>
+                  <a:srgbClr val="000000"/>
+                </a:solidFill>
+                <a:latin typeface="Cascadia Mono" panose="020B0609020000020004" pitchFamily="49" charset="0"/>
+              </a:rPr>
+              <a:t>(number =&gt; </a:t>
+            </a:r>
+            <a:r>
+              <a:rPr lang="en-US" sz="1400" dirty="0">
+                <a:solidFill>
+                  <a:srgbClr val="0000FF"/>
+                </a:solidFill>
+                <a:latin typeface="Cascadia Mono" panose="020B0609020000020004" pitchFamily="49" charset="0"/>
+              </a:rPr>
+              <a:t>new</a:t>
+            </a:r>
+            <a:r>
+              <a:rPr lang="en-US" sz="1400" dirty="0">
+                <a:solidFill>
+                  <a:srgbClr val="000000"/>
+                </a:solidFill>
+                <a:latin typeface="Cascadia Mono" panose="020B0609020000020004" pitchFamily="49" charset="0"/>
+              </a:rPr>
+              <a:t> </a:t>
+            </a:r>
+            <a:r>
+              <a:rPr lang="en-US" sz="1400" dirty="0">
+                <a:solidFill>
+                  <a:srgbClr val="0000FF"/>
+                </a:solidFill>
+                <a:latin typeface="Cascadia Mono" panose="020B0609020000020004" pitchFamily="49" charset="0"/>
+              </a:rPr>
+              <a:t>string</a:t>
+            </a:r>
+            <a:r>
+              <a:rPr lang="en-US" sz="1400" dirty="0">
+                <a:solidFill>
+                  <a:srgbClr val="000000"/>
+                </a:solidFill>
+                <a:latin typeface="Cascadia Mono" panose="020B0609020000020004" pitchFamily="49" charset="0"/>
+              </a:rPr>
+              <a:t>(</a:t>
+            </a:r>
+            <a:r>
+              <a:rPr lang="en-US" sz="1400" dirty="0">
+                <a:solidFill>
+                  <a:srgbClr val="A31515"/>
+                </a:solidFill>
+                <a:latin typeface="Cascadia Mono" panose="020B0609020000020004" pitchFamily="49" charset="0"/>
+              </a:rPr>
+              <a:t>'a'</a:t>
+            </a:r>
+            <a:r>
+              <a:rPr lang="en-US" sz="1400" dirty="0">
+                <a:solidFill>
+                  <a:srgbClr val="000000"/>
+                </a:solidFill>
+                <a:latin typeface="Cascadia Mono" panose="020B0609020000020004" pitchFamily="49" charset="0"/>
+              </a:rPr>
+              <a:t>, number)).Print();</a:t>
+            </a:r>
+            <a:r>
+              <a:rPr lang="en-US" sz="1400" dirty="0">
+                <a:solidFill>
+                  <a:srgbClr val="008000"/>
+                </a:solidFill>
+                <a:latin typeface="Cascadia Mono" panose="020B0609020000020004" pitchFamily="49" charset="0"/>
+              </a:rPr>
+              <a:t>//,</a:t>
+            </a:r>
+            <a:r>
+              <a:rPr lang="en-US" sz="1400" dirty="0" err="1">
+                <a:solidFill>
+                  <a:srgbClr val="008000"/>
+                </a:solidFill>
+                <a:latin typeface="Cascadia Mono" panose="020B0609020000020004" pitchFamily="49" charset="0"/>
+              </a:rPr>
+              <a:t>aa,aaa,aaaa,aaaaa</a:t>
+            </a:r>
+            <a:endParaRPr lang="en-US" sz="1400" dirty="0">
+              <a:solidFill>
+                <a:srgbClr val="000000"/>
+              </a:solidFill>
+              <a:latin typeface="Cascadia Mono" panose="020B0609020000020004" pitchFamily="49" charset="0"/>
+            </a:endParaRPr>
+          </a:p>
+          <a:p>
+            <a:endParaRPr lang="fr-CH" sz="1400" dirty="0">
+              <a:solidFill>
+                <a:srgbClr val="000000"/>
+              </a:solidFill>
+              <a:latin typeface="Cascadia Mono" panose="020B0609020000020004" pitchFamily="49" charset="0"/>
+            </a:endParaRPr>
+          </a:p>
+          <a:p>
+            <a:r>
+              <a:rPr lang="en-US" sz="1200" dirty="0" err="1">
+                <a:solidFill>
+                  <a:srgbClr val="0000FF"/>
+                </a:solidFill>
+                <a:latin typeface="Cascadia Mono" panose="020B0609020000020004" pitchFamily="49" charset="0"/>
+              </a:rPr>
+              <a:t>string</a:t>
+            </a:r>
+            <a:r>
+              <a:rPr lang="en-US" sz="1200" dirty="0" err="1">
+                <a:solidFill>
+                  <a:srgbClr val="000000"/>
+                </a:solidFill>
+                <a:latin typeface="Cascadia Mono" panose="020B0609020000020004" pitchFamily="49" charset="0"/>
+              </a:rPr>
+              <a:t>.Join</a:t>
+            </a:r>
+            <a:r>
+              <a:rPr lang="en-US" sz="1200" dirty="0">
+                <a:solidFill>
+                  <a:srgbClr val="000000"/>
+                </a:solidFill>
+                <a:latin typeface="Cascadia Mono" panose="020B0609020000020004" pitchFamily="49" charset="0"/>
+              </a:rPr>
+              <a:t>(</a:t>
+            </a:r>
+            <a:r>
+              <a:rPr lang="en-US" sz="1200" dirty="0">
+                <a:solidFill>
+                  <a:srgbClr val="A31515"/>
+                </a:solidFill>
+                <a:latin typeface="Cascadia Mono" panose="020B0609020000020004" pitchFamily="49" charset="0"/>
+              </a:rPr>
+              <a:t>','</a:t>
+            </a:r>
+            <a:r>
+              <a:rPr lang="en-US" sz="1200" dirty="0">
+                <a:solidFill>
+                  <a:srgbClr val="000000"/>
+                </a:solidFill>
+                <a:latin typeface="Cascadia Mono" panose="020B0609020000020004" pitchFamily="49" charset="0"/>
+              </a:rPr>
+              <a:t>, numbers).Select(character =&gt; Convert.ToInt32(character) + 1).Print();</a:t>
+            </a:r>
+            <a:r>
+              <a:rPr lang="en-US" sz="1200" dirty="0">
+                <a:solidFill>
+                  <a:srgbClr val="008000"/>
+                </a:solidFill>
+                <a:latin typeface="Cascadia Mono" panose="020B0609020000020004" pitchFamily="49" charset="0"/>
+              </a:rPr>
+              <a:t>//49,45,50,45,51,45,52,45,53</a:t>
+            </a:r>
+            <a:endParaRPr lang="en-US" sz="1200" dirty="0">
+              <a:solidFill>
+                <a:srgbClr val="000000"/>
+              </a:solidFill>
+              <a:latin typeface="Cascadia Mono" panose="020B0609020000020004" pitchFamily="49" charset="0"/>
+            </a:endParaRPr>
+          </a:p>
+          <a:p>
+            <a:endParaRPr lang="fr-CH" sz="1400" dirty="0">
+              <a:solidFill>
+                <a:srgbClr val="000000"/>
+              </a:solidFill>
+              <a:latin typeface="Cascadia Mono" panose="020B0609020000020004" pitchFamily="49" charset="0"/>
+            </a:endParaRPr>
+          </a:p>
+          <a:p>
+            <a:r>
+              <a:rPr lang="fr-CH" sz="1400" dirty="0">
                 <a:solidFill>
                   <a:srgbClr val="A31515"/>
                 </a:solidFill>
@@ -6632,7 +6666,7 @@
               <a:t>""</a:t>
             </a:r>
             <a:r>
-              <a:rPr lang="en-US" sz="1600" dirty="0">
+              <a:rPr lang="fr-CH" sz="1400" dirty="0">
                 <a:solidFill>
                   <a:srgbClr val="000000"/>
                 </a:solidFill>
@@ -6641,7 +6675,7 @@
               <a:t>.Select(_ =&gt; </a:t>
             </a:r>
             <a:r>
-              <a:rPr lang="en-US" sz="1600" dirty="0" err="1">
+              <a:rPr lang="fr-CH" sz="1400" dirty="0" err="1">
                 <a:solidFill>
                   <a:srgbClr val="000000"/>
                 </a:solidFill>
@@ -6650,24 +6684,42 @@
               <a:t>Enumerable.Range</a:t>
             </a:r>
             <a:r>
-              <a:rPr lang="en-US" sz="1600" dirty="0">
+              <a:rPr lang="fr-CH" sz="1400" dirty="0">
                 <a:solidFill>
                   <a:srgbClr val="000000"/>
                 </a:solidFill>
                 <a:latin typeface="Cascadia Mono" panose="020B0609020000020004" pitchFamily="49" charset="0"/>
               </a:rPr>
-              <a:t>(0, 5));</a:t>
-            </a:r>
-            <a:r>
-              <a:rPr lang="en-US" sz="1600" dirty="0">
-                <a:solidFill>
-                  <a:srgbClr val="008000"/>
+              <a:t>(0, 5000)).</a:t>
+            </a:r>
+            <a:r>
+              <a:rPr lang="fr-CH" sz="1400" dirty="0" err="1">
+                <a:solidFill>
+                  <a:srgbClr val="000000"/>
                 </a:solidFill>
                 <a:latin typeface="Cascadia Mono" panose="020B0609020000020004" pitchFamily="49" charset="0"/>
               </a:rPr>
-              <a:t>//0,1,2,3,4</a:t>
-            </a:r>
-            <a:endParaRPr lang="fr-CH" sz="1600" dirty="0"/>
+              <a:t>Print</a:t>
+            </a:r>
+            <a:r>
+              <a:rPr lang="fr-CH" sz="1400" dirty="0">
+                <a:solidFill>
+                  <a:srgbClr val="000000"/>
+                </a:solidFill>
+                <a:latin typeface="Cascadia Mono" panose="020B0609020000020004" pitchFamily="49" charset="0"/>
+              </a:rPr>
+              <a:t>();</a:t>
+            </a:r>
+            <a:r>
+              <a:rPr lang="fr-CH" sz="1400" dirty="0">
+                <a:solidFill>
+                  <a:srgbClr val="008000"/>
+                </a:solidFill>
+                <a:latin typeface="Cascadia Mono" panose="020B0609020000020004" pitchFamily="49" charset="0"/>
+              </a:rPr>
+              <a:t>// /!\PAS d’élément en entrée, PAS d’élément en sortie /!\</a:t>
+            </a:r>
+            <a:endParaRPr lang="fr-CH" sz="1400" dirty="0"/>
           </a:p>
         </p:txBody>
       </p:sp>
@@ -6836,54 +6888,6 @@
                       </p:childTnLst>
                     </p:cTn>
                   </p:par>
-                  <p:par>
-                    <p:cTn id="15" fill="hold">
-                      <p:stCondLst>
-                        <p:cond delay="indefinite"/>
-                      </p:stCondLst>
-                      <p:childTnLst>
-                        <p:par>
-                          <p:cTn id="16" fill="hold">
-                            <p:stCondLst>
-                              <p:cond delay="0"/>
-                            </p:stCondLst>
-                            <p:childTnLst>
-                              <p:par>
-                                <p:cTn id="17" presetID="1" presetClass="entr" presetSubtype="0" fill="hold" grpId="0" nodeType="clickEffect">
-                                  <p:stCondLst>
-                                    <p:cond delay="0"/>
-                                  </p:stCondLst>
-                                  <p:iterate type="lt">
-                                    <p:tmAbs val="30"/>
-                                  </p:iterate>
-                                  <p:childTnLst>
-                                    <p:set>
-                                      <p:cBhvr>
-                                        <p:cTn id="18" dur="1" fill="hold">
-                                          <p:stCondLst>
-                                            <p:cond delay="0"/>
-                                          </p:stCondLst>
-                                        </p:cTn>
-                                        <p:tgtEl>
-                                          <p:spTgt spid="5"/>
-                                        </p:tgtEl>
-                                        <p:attrNameLst>
-                                          <p:attrName>style.visibility</p:attrName>
-                                        </p:attrNameLst>
-                                      </p:cBhvr>
-                                      <p:to>
-                                        <p:strVal val="visible"/>
-                                      </p:to>
-                                    </p:set>
-                                  </p:childTnLst>
-                                </p:cTn>
-                              </p:par>
-                            </p:childTnLst>
-                          </p:cTn>
-                        </p:par>
-                      </p:childTnLst>
-                    </p:cTn>
-                  </p:par>
                 </p:childTnLst>
               </p:cTn>
               <p:prevCondLst>
@@ -6907,7 +6911,6 @@
     </p:tnLst>
     <p:bldLst>
       <p:bldP spid="3" grpId="0" build="p"/>
-      <p:bldP spid="5" grpId="0" animBg="1"/>
     </p:bldLst>
   </p:timing>
 </p:sld>
@@ -7375,7 +7378,7 @@
                 </a:solidFill>
                 <a:latin typeface="Cascadia Mono" panose="020B0609020000020004" pitchFamily="49" charset="0"/>
               </a:rPr>
-              <a:t>Math.Max</a:t>
+              <a:t>Math.Min</a:t>
             </a:r>
             <a:r>
               <a:rPr lang="fr-CH" sz="1600" dirty="0">

</xml_diff>